<commit_message>
feat: add stop remindering view
</commit_message>
<xml_diff>
--- a/Reminder App/UI.pptx
+++ b/Reminder App/UI.pptx
@@ -7,6 +7,7 @@
   <p:sldIdLst>
     <p:sldId id="256" r:id="rId2"/>
     <p:sldId id="257" r:id="rId3"/>
+    <p:sldId id="258" r:id="rId4"/>
   </p:sldIdLst>
   <p:sldSz cx="12192000" cy="6858000"/>
   <p:notesSz cx="6858000" cy="9144000"/>
@@ -262,7 +263,7 @@
           <a:p>
             <a:fld id="{6B4E262F-3FDE-4F28-9A09-D9E90AA8F2D4}" type="datetimeFigureOut">
               <a:rPr lang="vi-VN" smtClean="0"/>
-              <a:t>28/01/2024</a:t>
+              <a:t>01/02/2024</a:t>
             </a:fld>
             <a:endParaRPr lang="vi-VN"/>
           </a:p>
@@ -462,7 +463,7 @@
           <a:p>
             <a:fld id="{6B4E262F-3FDE-4F28-9A09-D9E90AA8F2D4}" type="datetimeFigureOut">
               <a:rPr lang="vi-VN" smtClean="0"/>
-              <a:t>28/01/2024</a:t>
+              <a:t>01/02/2024</a:t>
             </a:fld>
             <a:endParaRPr lang="vi-VN"/>
           </a:p>
@@ -672,7 +673,7 @@
           <a:p>
             <a:fld id="{6B4E262F-3FDE-4F28-9A09-D9E90AA8F2D4}" type="datetimeFigureOut">
               <a:rPr lang="vi-VN" smtClean="0"/>
-              <a:t>28/01/2024</a:t>
+              <a:t>01/02/2024</a:t>
             </a:fld>
             <a:endParaRPr lang="vi-VN"/>
           </a:p>
@@ -872,7 +873,7 @@
           <a:p>
             <a:fld id="{6B4E262F-3FDE-4F28-9A09-D9E90AA8F2D4}" type="datetimeFigureOut">
               <a:rPr lang="vi-VN" smtClean="0"/>
-              <a:t>28/01/2024</a:t>
+              <a:t>01/02/2024</a:t>
             </a:fld>
             <a:endParaRPr lang="vi-VN"/>
           </a:p>
@@ -1148,7 +1149,7 @@
           <a:p>
             <a:fld id="{6B4E262F-3FDE-4F28-9A09-D9E90AA8F2D4}" type="datetimeFigureOut">
               <a:rPr lang="vi-VN" smtClean="0"/>
-              <a:t>28/01/2024</a:t>
+              <a:t>01/02/2024</a:t>
             </a:fld>
             <a:endParaRPr lang="vi-VN"/>
           </a:p>
@@ -1416,7 +1417,7 @@
           <a:p>
             <a:fld id="{6B4E262F-3FDE-4F28-9A09-D9E90AA8F2D4}" type="datetimeFigureOut">
               <a:rPr lang="vi-VN" smtClean="0"/>
-              <a:t>28/01/2024</a:t>
+              <a:t>01/02/2024</a:t>
             </a:fld>
             <a:endParaRPr lang="vi-VN"/>
           </a:p>
@@ -1831,7 +1832,7 @@
           <a:p>
             <a:fld id="{6B4E262F-3FDE-4F28-9A09-D9E90AA8F2D4}" type="datetimeFigureOut">
               <a:rPr lang="vi-VN" smtClean="0"/>
-              <a:t>28/01/2024</a:t>
+              <a:t>01/02/2024</a:t>
             </a:fld>
             <a:endParaRPr lang="vi-VN"/>
           </a:p>
@@ -1973,7 +1974,7 @@
           <a:p>
             <a:fld id="{6B4E262F-3FDE-4F28-9A09-D9E90AA8F2D4}" type="datetimeFigureOut">
               <a:rPr lang="vi-VN" smtClean="0"/>
-              <a:t>28/01/2024</a:t>
+              <a:t>01/02/2024</a:t>
             </a:fld>
             <a:endParaRPr lang="vi-VN"/>
           </a:p>
@@ -2086,7 +2087,7 @@
           <a:p>
             <a:fld id="{6B4E262F-3FDE-4F28-9A09-D9E90AA8F2D4}" type="datetimeFigureOut">
               <a:rPr lang="vi-VN" smtClean="0"/>
-              <a:t>28/01/2024</a:t>
+              <a:t>01/02/2024</a:t>
             </a:fld>
             <a:endParaRPr lang="vi-VN"/>
           </a:p>
@@ -2399,7 +2400,7 @@
           <a:p>
             <a:fld id="{6B4E262F-3FDE-4F28-9A09-D9E90AA8F2D4}" type="datetimeFigureOut">
               <a:rPr lang="vi-VN" smtClean="0"/>
-              <a:t>28/01/2024</a:t>
+              <a:t>01/02/2024</a:t>
             </a:fld>
             <a:endParaRPr lang="vi-VN"/>
           </a:p>
@@ -2688,7 +2689,7 @@
           <a:p>
             <a:fld id="{6B4E262F-3FDE-4F28-9A09-D9E90AA8F2D4}" type="datetimeFigureOut">
               <a:rPr lang="vi-VN" smtClean="0"/>
-              <a:t>28/01/2024</a:t>
+              <a:t>01/02/2024</a:t>
             </a:fld>
             <a:endParaRPr lang="vi-VN"/>
           </a:p>
@@ -2931,7 +2932,7 @@
           <a:p>
             <a:fld id="{6B4E262F-3FDE-4F28-9A09-D9E90AA8F2D4}" type="datetimeFigureOut">
               <a:rPr lang="vi-VN" smtClean="0"/>
-              <a:t>28/01/2024</a:t>
+              <a:t>01/02/2024</a:t>
             </a:fld>
             <a:endParaRPr lang="vi-VN"/>
           </a:p>
@@ -5241,6 +5242,601 @@
 </p:sld>
 </file>
 
+<file path=ppt/slides/slide3.xml><?xml version="1.0" encoding="utf-8"?>
+<p:sld xmlns:a="http://schemas.openxmlformats.org/drawingml/2006/main" xmlns:r="http://schemas.openxmlformats.org/officeDocument/2006/relationships" xmlns:p="http://schemas.openxmlformats.org/presentationml/2006/main">
+  <p:cSld>
+    <p:spTree>
+      <p:nvGrpSpPr>
+        <p:cNvPr id="1" name=""/>
+        <p:cNvGrpSpPr/>
+        <p:nvPr/>
+      </p:nvGrpSpPr>
+      <p:grpSpPr>
+        <a:xfrm>
+          <a:off x="0" y="0"/>
+          <a:ext cx="0" cy="0"/>
+          <a:chOff x="0" y="0"/>
+          <a:chExt cx="0" cy="0"/>
+        </a:xfrm>
+      </p:grpSpPr>
+      <p:sp>
+        <p:nvSpPr>
+          <p:cNvPr id="4" name="Rectangle 3">
+            <a:extLst>
+              <a:ext uri="{FF2B5EF4-FFF2-40B4-BE49-F238E27FC236}">
+                <a16:creationId xmlns:a16="http://schemas.microsoft.com/office/drawing/2014/main" id="{0954117F-8664-9658-1489-79C95C26CC6C}"/>
+              </a:ext>
+            </a:extLst>
+          </p:cNvPr>
+          <p:cNvSpPr/>
+          <p:nvPr/>
+        </p:nvSpPr>
+        <p:spPr>
+          <a:xfrm>
+            <a:off x="1479175" y="797858"/>
+            <a:ext cx="8794377" cy="5074023"/>
+          </a:xfrm>
+          <a:prstGeom prst="rect">
+            <a:avLst/>
+          </a:prstGeom>
+        </p:spPr>
+        <p:style>
+          <a:lnRef idx="2">
+            <a:schemeClr val="accent6">
+              <a:shade val="15000"/>
+            </a:schemeClr>
+          </a:lnRef>
+          <a:fillRef idx="1">
+            <a:schemeClr val="accent6"/>
+          </a:fillRef>
+          <a:effectRef idx="0">
+            <a:schemeClr val="accent6"/>
+          </a:effectRef>
+          <a:fontRef idx="minor">
+            <a:schemeClr val="lt1"/>
+          </a:fontRef>
+        </p:style>
+        <p:txBody>
+          <a:bodyPr rtlCol="0" anchor="ctr"/>
+          <a:lstStyle/>
+          <a:p>
+            <a:pPr algn="ctr"/>
+            <a:endParaRPr lang="vi-VN"/>
+          </a:p>
+        </p:txBody>
+      </p:sp>
+      <p:sp>
+        <p:nvSpPr>
+          <p:cNvPr id="5" name="Rectangle 4">
+            <a:extLst>
+              <a:ext uri="{FF2B5EF4-FFF2-40B4-BE49-F238E27FC236}">
+                <a16:creationId xmlns:a16="http://schemas.microsoft.com/office/drawing/2014/main" id="{A0A4AD04-AAE0-3253-B6EB-589ABF956F34}"/>
+              </a:ext>
+            </a:extLst>
+          </p:cNvPr>
+          <p:cNvSpPr/>
+          <p:nvPr/>
+        </p:nvSpPr>
+        <p:spPr>
+          <a:xfrm>
+            <a:off x="1479175" y="797858"/>
+            <a:ext cx="8794377" cy="484095"/>
+          </a:xfrm>
+          <a:prstGeom prst="rect">
+            <a:avLst/>
+          </a:prstGeom>
+        </p:spPr>
+        <p:style>
+          <a:lnRef idx="2">
+            <a:schemeClr val="accent1">
+              <a:shade val="15000"/>
+            </a:schemeClr>
+          </a:lnRef>
+          <a:fillRef idx="1">
+            <a:schemeClr val="accent1"/>
+          </a:fillRef>
+          <a:effectRef idx="0">
+            <a:schemeClr val="accent1"/>
+          </a:effectRef>
+          <a:fontRef idx="minor">
+            <a:schemeClr val="lt1"/>
+          </a:fontRef>
+        </p:style>
+        <p:txBody>
+          <a:bodyPr rtlCol="0" anchor="ctr"/>
+          <a:lstStyle/>
+          <a:p>
+            <a:pPr algn="ctr"/>
+            <a:endParaRPr lang="vi-VN"/>
+          </a:p>
+        </p:txBody>
+      </p:sp>
+      <p:sp>
+        <p:nvSpPr>
+          <p:cNvPr id="6" name="Cross 5">
+            <a:extLst>
+              <a:ext uri="{FF2B5EF4-FFF2-40B4-BE49-F238E27FC236}">
+                <a16:creationId xmlns:a16="http://schemas.microsoft.com/office/drawing/2014/main" id="{D44A105E-3AEA-1BCF-8BBC-B00F7E19D54A}"/>
+              </a:ext>
+            </a:extLst>
+          </p:cNvPr>
+          <p:cNvSpPr/>
+          <p:nvPr/>
+        </p:nvSpPr>
+        <p:spPr>
+          <a:xfrm rot="2694734">
+            <a:off x="9998736" y="953570"/>
+            <a:ext cx="172668" cy="172668"/>
+          </a:xfrm>
+          <a:prstGeom prst="plus">
+            <a:avLst>
+              <a:gd name="adj" fmla="val 42045"/>
+            </a:avLst>
+          </a:prstGeom>
+        </p:spPr>
+        <p:style>
+          <a:lnRef idx="2">
+            <a:schemeClr val="accent4">
+              <a:shade val="15000"/>
+            </a:schemeClr>
+          </a:lnRef>
+          <a:fillRef idx="1">
+            <a:schemeClr val="accent4"/>
+          </a:fillRef>
+          <a:effectRef idx="0">
+            <a:schemeClr val="accent4"/>
+          </a:effectRef>
+          <a:fontRef idx="minor">
+            <a:schemeClr val="lt1"/>
+          </a:fontRef>
+        </p:style>
+        <p:txBody>
+          <a:bodyPr rtlCol="0" anchor="ctr"/>
+          <a:lstStyle/>
+          <a:p>
+            <a:pPr algn="ctr"/>
+            <a:endParaRPr lang="vi-VN"/>
+          </a:p>
+        </p:txBody>
+      </p:sp>
+      <p:sp>
+        <p:nvSpPr>
+          <p:cNvPr id="7" name="Rectangle 6">
+            <a:extLst>
+              <a:ext uri="{FF2B5EF4-FFF2-40B4-BE49-F238E27FC236}">
+                <a16:creationId xmlns:a16="http://schemas.microsoft.com/office/drawing/2014/main" id="{29E393C0-C61B-E9B1-127A-4E47BAC77864}"/>
+              </a:ext>
+            </a:extLst>
+          </p:cNvPr>
+          <p:cNvSpPr/>
+          <p:nvPr/>
+        </p:nvSpPr>
+        <p:spPr>
+          <a:xfrm>
+            <a:off x="9283700" y="986119"/>
+            <a:ext cx="270510" cy="95250"/>
+          </a:xfrm>
+          <a:prstGeom prst="rect">
+            <a:avLst/>
+          </a:prstGeom>
+        </p:spPr>
+        <p:style>
+          <a:lnRef idx="2">
+            <a:schemeClr val="accent4">
+              <a:shade val="15000"/>
+            </a:schemeClr>
+          </a:lnRef>
+          <a:fillRef idx="1">
+            <a:schemeClr val="accent4"/>
+          </a:fillRef>
+          <a:effectRef idx="0">
+            <a:schemeClr val="accent4"/>
+          </a:effectRef>
+          <a:fontRef idx="minor">
+            <a:schemeClr val="lt1"/>
+          </a:fontRef>
+        </p:style>
+        <p:txBody>
+          <a:bodyPr rtlCol="0" anchor="ctr"/>
+          <a:lstStyle/>
+          <a:p>
+            <a:pPr algn="ctr"/>
+            <a:endParaRPr lang="vi-VN"/>
+          </a:p>
+        </p:txBody>
+      </p:sp>
+      <p:sp>
+        <p:nvSpPr>
+          <p:cNvPr id="8" name="Rectangle 7">
+            <a:extLst>
+              <a:ext uri="{FF2B5EF4-FFF2-40B4-BE49-F238E27FC236}">
+                <a16:creationId xmlns:a16="http://schemas.microsoft.com/office/drawing/2014/main" id="{BC63BCD5-78EC-8C4F-E3BA-C08F63A889E1}"/>
+              </a:ext>
+            </a:extLst>
+          </p:cNvPr>
+          <p:cNvSpPr/>
+          <p:nvPr/>
+        </p:nvSpPr>
+        <p:spPr>
+          <a:xfrm>
+            <a:off x="9693388" y="933049"/>
+            <a:ext cx="203200" cy="203200"/>
+          </a:xfrm>
+          <a:prstGeom prst="rect">
+            <a:avLst/>
+          </a:prstGeom>
+        </p:spPr>
+        <p:style>
+          <a:lnRef idx="2">
+            <a:schemeClr val="accent4">
+              <a:shade val="15000"/>
+            </a:schemeClr>
+          </a:lnRef>
+          <a:fillRef idx="1">
+            <a:schemeClr val="accent4"/>
+          </a:fillRef>
+          <a:effectRef idx="0">
+            <a:schemeClr val="accent4"/>
+          </a:effectRef>
+          <a:fontRef idx="minor">
+            <a:schemeClr val="lt1"/>
+          </a:fontRef>
+        </p:style>
+        <p:txBody>
+          <a:bodyPr rtlCol="0" anchor="ctr"/>
+          <a:lstStyle/>
+          <a:p>
+            <a:pPr algn="ctr"/>
+            <a:endParaRPr lang="vi-VN"/>
+          </a:p>
+        </p:txBody>
+      </p:sp>
+      <p:sp>
+        <p:nvSpPr>
+          <p:cNvPr id="13" name="TextBox 12">
+            <a:extLst>
+              <a:ext uri="{FF2B5EF4-FFF2-40B4-BE49-F238E27FC236}">
+                <a16:creationId xmlns:a16="http://schemas.microsoft.com/office/drawing/2014/main" id="{A96932FD-63FC-B82D-12C3-5D6815247A3D}"/>
+              </a:ext>
+            </a:extLst>
+          </p:cNvPr>
+          <p:cNvSpPr txBox="1"/>
+          <p:nvPr/>
+        </p:nvSpPr>
+        <p:spPr>
+          <a:xfrm>
+            <a:off x="1479175" y="833608"/>
+            <a:ext cx="1630383" cy="369332"/>
+          </a:xfrm>
+          <a:prstGeom prst="rect">
+            <a:avLst/>
+          </a:prstGeom>
+          <a:noFill/>
+        </p:spPr>
+        <p:txBody>
+          <a:bodyPr wrap="none" rtlCol="0">
+            <a:spAutoFit/>
+          </a:bodyPr>
+          <a:lstStyle/>
+          <a:p>
+            <a:r>
+              <a:rPr lang="en-US" b="1" spc="50" dirty="0">
+                <a:ln w="9525" cmpd="sng">
+                  <a:solidFill>
+                    <a:schemeClr val="accent1"/>
+                  </a:solidFill>
+                  <a:prstDash val="solid"/>
+                </a:ln>
+                <a:solidFill>
+                  <a:srgbClr val="70AD47">
+                    <a:tint val="1000"/>
+                  </a:srgbClr>
+                </a:solidFill>
+                <a:effectLst>
+                  <a:glow rad="38100">
+                    <a:schemeClr val="accent1">
+                      <a:alpha val="40000"/>
+                    </a:schemeClr>
+                  </a:glow>
+                </a:effectLst>
+              </a:rPr>
+              <a:t>Reminder App</a:t>
+            </a:r>
+            <a:endParaRPr lang="vi-VN" b="1" spc="50" dirty="0">
+              <a:ln w="9525" cmpd="sng">
+                <a:solidFill>
+                  <a:schemeClr val="accent1"/>
+                </a:solidFill>
+                <a:prstDash val="solid"/>
+              </a:ln>
+              <a:solidFill>
+                <a:srgbClr val="70AD47">
+                  <a:tint val="1000"/>
+                </a:srgbClr>
+              </a:solidFill>
+              <a:effectLst>
+                <a:glow rad="38100">
+                  <a:schemeClr val="accent1">
+                    <a:alpha val="40000"/>
+                  </a:schemeClr>
+                </a:glow>
+              </a:effectLst>
+            </a:endParaRPr>
+          </a:p>
+        </p:txBody>
+      </p:sp>
+      <p:sp>
+        <p:nvSpPr>
+          <p:cNvPr id="30" name="Rectangle: Rounded Corners 29">
+            <a:extLst>
+              <a:ext uri="{FF2B5EF4-FFF2-40B4-BE49-F238E27FC236}">
+                <a16:creationId xmlns:a16="http://schemas.microsoft.com/office/drawing/2014/main" id="{DF2E5B97-6495-7A98-1618-1CAF4B3A48A2}"/>
+              </a:ext>
+            </a:extLst>
+          </p:cNvPr>
+          <p:cNvSpPr/>
+          <p:nvPr/>
+        </p:nvSpPr>
+        <p:spPr>
+          <a:xfrm>
+            <a:off x="1560307" y="1350260"/>
+            <a:ext cx="2502647" cy="685930"/>
+          </a:xfrm>
+          <a:prstGeom prst="roundRect">
+            <a:avLst>
+              <a:gd name="adj" fmla="val 1970"/>
+            </a:avLst>
+          </a:prstGeom>
+        </p:spPr>
+        <p:style>
+          <a:lnRef idx="2">
+            <a:schemeClr val="accent1">
+              <a:shade val="15000"/>
+            </a:schemeClr>
+          </a:lnRef>
+          <a:fillRef idx="1">
+            <a:schemeClr val="accent1"/>
+          </a:fillRef>
+          <a:effectRef idx="0">
+            <a:schemeClr val="accent1"/>
+          </a:effectRef>
+          <a:fontRef idx="minor">
+            <a:schemeClr val="lt1"/>
+          </a:fontRef>
+        </p:style>
+        <p:txBody>
+          <a:bodyPr rtlCol="0" anchor="ctr"/>
+          <a:lstStyle/>
+          <a:p>
+            <a:pPr algn="ctr"/>
+            <a:r>
+              <a:rPr lang="en-US" dirty="0"/>
+              <a:t>Stop Reminding</a:t>
+            </a:r>
+            <a:endParaRPr lang="vi-VN" dirty="0"/>
+          </a:p>
+        </p:txBody>
+      </p:sp>
+      <p:sp>
+        <p:nvSpPr>
+          <p:cNvPr id="2" name="Rectangle: Rounded Corners 1">
+            <a:extLst>
+              <a:ext uri="{FF2B5EF4-FFF2-40B4-BE49-F238E27FC236}">
+                <a16:creationId xmlns:a16="http://schemas.microsoft.com/office/drawing/2014/main" id="{0E941078-A6B7-0C35-FD9A-43F1795B683D}"/>
+              </a:ext>
+            </a:extLst>
+          </p:cNvPr>
+          <p:cNvSpPr/>
+          <p:nvPr/>
+        </p:nvSpPr>
+        <p:spPr>
+          <a:xfrm>
+            <a:off x="1560307" y="2177592"/>
+            <a:ext cx="8545229" cy="898235"/>
+          </a:xfrm>
+          <a:prstGeom prst="roundRect">
+            <a:avLst>
+              <a:gd name="adj" fmla="val 1970"/>
+            </a:avLst>
+          </a:prstGeom>
+        </p:spPr>
+        <p:style>
+          <a:lnRef idx="2">
+            <a:schemeClr val="accent1">
+              <a:shade val="15000"/>
+            </a:schemeClr>
+          </a:lnRef>
+          <a:fillRef idx="1">
+            <a:schemeClr val="accent1"/>
+          </a:fillRef>
+          <a:effectRef idx="0">
+            <a:schemeClr val="accent1"/>
+          </a:effectRef>
+          <a:fontRef idx="minor">
+            <a:schemeClr val="lt1"/>
+          </a:fontRef>
+        </p:style>
+        <p:txBody>
+          <a:bodyPr rtlCol="0" anchor="ctr"/>
+          <a:lstStyle/>
+          <a:p>
+            <a:pPr algn="ctr"/>
+            <a:endParaRPr lang="vi-VN" dirty="0"/>
+          </a:p>
+        </p:txBody>
+      </p:sp>
+      <p:sp>
+        <p:nvSpPr>
+          <p:cNvPr id="3" name="Rectangle: Rounded Corners 2">
+            <a:extLst>
+              <a:ext uri="{FF2B5EF4-FFF2-40B4-BE49-F238E27FC236}">
+                <a16:creationId xmlns:a16="http://schemas.microsoft.com/office/drawing/2014/main" id="{36305C60-0142-ECD2-937A-DD049F84D3C2}"/>
+              </a:ext>
+            </a:extLst>
+          </p:cNvPr>
+          <p:cNvSpPr/>
+          <p:nvPr/>
+        </p:nvSpPr>
+        <p:spPr>
+          <a:xfrm>
+            <a:off x="1560306" y="3195781"/>
+            <a:ext cx="8545229" cy="1020782"/>
+          </a:xfrm>
+          <a:prstGeom prst="roundRect">
+            <a:avLst>
+              <a:gd name="adj" fmla="val 1970"/>
+            </a:avLst>
+          </a:prstGeom>
+        </p:spPr>
+        <p:style>
+          <a:lnRef idx="2">
+            <a:schemeClr val="accent1">
+              <a:shade val="15000"/>
+            </a:schemeClr>
+          </a:lnRef>
+          <a:fillRef idx="1">
+            <a:schemeClr val="accent1"/>
+          </a:fillRef>
+          <a:effectRef idx="0">
+            <a:schemeClr val="accent1"/>
+          </a:effectRef>
+          <a:fontRef idx="minor">
+            <a:schemeClr val="lt1"/>
+          </a:fontRef>
+        </p:style>
+        <p:txBody>
+          <a:bodyPr rtlCol="0" anchor="ctr"/>
+          <a:lstStyle/>
+          <a:p>
+            <a:pPr algn="ctr"/>
+            <a:endParaRPr lang="vi-VN" dirty="0"/>
+          </a:p>
+        </p:txBody>
+      </p:sp>
+      <p:sp>
+        <p:nvSpPr>
+          <p:cNvPr id="10" name="Rectangle: Rounded Corners 9">
+            <a:extLst>
+              <a:ext uri="{FF2B5EF4-FFF2-40B4-BE49-F238E27FC236}">
+                <a16:creationId xmlns:a16="http://schemas.microsoft.com/office/drawing/2014/main" id="{D38E9C30-86A3-AE5A-8D7C-727A3E4E4357}"/>
+              </a:ext>
+            </a:extLst>
+          </p:cNvPr>
+          <p:cNvSpPr/>
+          <p:nvPr/>
+        </p:nvSpPr>
+        <p:spPr>
+          <a:xfrm>
+            <a:off x="1560304" y="4336517"/>
+            <a:ext cx="8545229" cy="1039637"/>
+          </a:xfrm>
+          <a:prstGeom prst="roundRect">
+            <a:avLst>
+              <a:gd name="adj" fmla="val 1970"/>
+            </a:avLst>
+          </a:prstGeom>
+        </p:spPr>
+        <p:style>
+          <a:lnRef idx="2">
+            <a:schemeClr val="accent1">
+              <a:shade val="15000"/>
+            </a:schemeClr>
+          </a:lnRef>
+          <a:fillRef idx="1">
+            <a:schemeClr val="accent1"/>
+          </a:fillRef>
+          <a:effectRef idx="0">
+            <a:schemeClr val="accent1"/>
+          </a:effectRef>
+          <a:fontRef idx="minor">
+            <a:schemeClr val="lt1"/>
+          </a:fontRef>
+        </p:style>
+        <p:txBody>
+          <a:bodyPr rtlCol="0" anchor="ctr"/>
+          <a:lstStyle/>
+          <a:p>
+            <a:pPr algn="ctr"/>
+            <a:endParaRPr lang="vi-VN" dirty="0"/>
+          </a:p>
+        </p:txBody>
+      </p:sp>
+      <p:sp>
+        <p:nvSpPr>
+          <p:cNvPr id="12" name="TextBox 11">
+            <a:extLst>
+              <a:ext uri="{FF2B5EF4-FFF2-40B4-BE49-F238E27FC236}">
+                <a16:creationId xmlns:a16="http://schemas.microsoft.com/office/drawing/2014/main" id="{833E5597-9827-843D-5ABE-F74F7406354F}"/>
+              </a:ext>
+            </a:extLst>
+          </p:cNvPr>
+          <p:cNvSpPr txBox="1"/>
+          <p:nvPr/>
+        </p:nvSpPr>
+        <p:spPr>
+          <a:xfrm>
+            <a:off x="1679453" y="2277801"/>
+            <a:ext cx="1350617" cy="646331"/>
+          </a:xfrm>
+          <a:prstGeom prst="rect">
+            <a:avLst/>
+          </a:prstGeom>
+          <a:noFill/>
+        </p:spPr>
+        <p:txBody>
+          <a:bodyPr wrap="square" rtlCol="0">
+            <a:spAutoFit/>
+          </a:bodyPr>
+          <a:lstStyle/>
+          <a:p>
+            <a:r>
+              <a:rPr lang="en-US" dirty="0" err="1"/>
+              <a:t>Uống</a:t>
+            </a:r>
+            <a:r>
+              <a:rPr lang="en-US" dirty="0"/>
+              <a:t> </a:t>
+            </a:r>
+            <a:r>
+              <a:rPr lang="en-US" dirty="0" err="1"/>
+              <a:t>nước</a:t>
+            </a:r>
+            <a:endParaRPr lang="en-US" dirty="0"/>
+          </a:p>
+          <a:p>
+            <a:r>
+              <a:rPr lang="en-US" dirty="0" err="1"/>
+              <a:t>Lặp</a:t>
+            </a:r>
+            <a:r>
+              <a:rPr lang="en-US" dirty="0"/>
+              <a:t> </a:t>
+            </a:r>
+            <a:r>
+              <a:rPr lang="en-US" dirty="0" err="1"/>
+              <a:t>lại</a:t>
+            </a:r>
+            <a:r>
+              <a:rPr lang="en-US" dirty="0"/>
+              <a:t>: 1</a:t>
+            </a:r>
+            <a:endParaRPr lang="vi-VN" dirty="0"/>
+          </a:p>
+        </p:txBody>
+      </p:sp>
+    </p:spTree>
+    <p:extLst>
+      <p:ext uri="{BB962C8B-B14F-4D97-AF65-F5344CB8AC3E}">
+        <p14:creationId xmlns:p14="http://schemas.microsoft.com/office/powerpoint/2010/main" val="2646460932"/>
+      </p:ext>
+    </p:extLst>
+  </p:cSld>
+  <p:clrMapOvr>
+    <a:masterClrMapping/>
+  </p:clrMapOvr>
+</p:sld>
+</file>
+
 <file path=ppt/theme/theme1.xml><?xml version="1.0" encoding="utf-8"?>
 <a:theme xmlns:a="http://schemas.openxmlformats.org/drawingml/2006/main" name="Office Theme">
   <a:themeElements>

</xml_diff>